<commit_message>
minor edits by kevin, alignment, added bullets, footnotes for figures, title change
</commit_message>
<xml_diff>
--- a/aspire_poster.pptx
+++ b/aspire_poster.pptx
@@ -192,7 +192,7 @@
           <a:p>
             <a:fld id="{C0783E2D-688F-4C78-8A82-0D3B92D958DC}" type="datetimeFigureOut">
               <a:rPr lang="en-US" smtClean="0"/>
-              <a:t>1/5/2014</a:t>
+              <a:t>1/5/14</a:t>
             </a:fld>
             <a:endParaRPr lang="en-US"/>
           </a:p>
@@ -527,7 +527,7 @@
             </a:endParaRPr>
           </a:p>
           <a:p>
-            <a:endParaRPr lang="en-US"/>
+            <a:endParaRPr lang="en-US" dirty="0"/>
           </a:p>
         </p:txBody>
       </p:sp>
@@ -736,7 +736,7 @@
           <a:p>
             <a:fld id="{A8FF2306-292D-41C8-8AE3-F53CB7571D2B}" type="datetimeFigureOut">
               <a:rPr lang="en-US" smtClean="0"/>
-              <a:t>1/5/2014</a:t>
+              <a:t>1/5/14</a:t>
             </a:fld>
             <a:endParaRPr lang="en-US"/>
           </a:p>
@@ -916,7 +916,7 @@
           <a:p>
             <a:fld id="{A8FF2306-292D-41C8-8AE3-F53CB7571D2B}" type="datetimeFigureOut">
               <a:rPr lang="en-US" smtClean="0"/>
-              <a:t>1/5/2014</a:t>
+              <a:t>1/5/14</a:t>
             </a:fld>
             <a:endParaRPr lang="en-US"/>
           </a:p>
@@ -1086,7 +1086,7 @@
           <a:p>
             <a:fld id="{A8FF2306-292D-41C8-8AE3-F53CB7571D2B}" type="datetimeFigureOut">
               <a:rPr lang="en-US" smtClean="0"/>
-              <a:t>1/5/2014</a:t>
+              <a:t>1/5/14</a:t>
             </a:fld>
             <a:endParaRPr lang="en-US"/>
           </a:p>
@@ -1332,7 +1332,7 @@
           <a:p>
             <a:fld id="{A8FF2306-292D-41C8-8AE3-F53CB7571D2B}" type="datetimeFigureOut">
               <a:rPr lang="en-US" smtClean="0"/>
-              <a:t>1/5/2014</a:t>
+              <a:t>1/5/14</a:t>
             </a:fld>
             <a:endParaRPr lang="en-US"/>
           </a:p>
@@ -1620,7 +1620,7 @@
           <a:p>
             <a:fld id="{A8FF2306-292D-41C8-8AE3-F53CB7571D2B}" type="datetimeFigureOut">
               <a:rPr lang="en-US" smtClean="0"/>
-              <a:t>1/5/2014</a:t>
+              <a:t>1/5/14</a:t>
             </a:fld>
             <a:endParaRPr lang="en-US"/>
           </a:p>
@@ -2042,7 +2042,7 @@
           <a:p>
             <a:fld id="{A8FF2306-292D-41C8-8AE3-F53CB7571D2B}" type="datetimeFigureOut">
               <a:rPr lang="en-US" smtClean="0"/>
-              <a:t>1/5/2014</a:t>
+              <a:t>1/5/14</a:t>
             </a:fld>
             <a:endParaRPr lang="en-US"/>
           </a:p>
@@ -2160,7 +2160,7 @@
           <a:p>
             <a:fld id="{A8FF2306-292D-41C8-8AE3-F53CB7571D2B}" type="datetimeFigureOut">
               <a:rPr lang="en-US" smtClean="0"/>
-              <a:t>1/5/2014</a:t>
+              <a:t>1/5/14</a:t>
             </a:fld>
             <a:endParaRPr lang="en-US"/>
           </a:p>
@@ -2255,7 +2255,7 @@
           <a:p>
             <a:fld id="{A8FF2306-292D-41C8-8AE3-F53CB7571D2B}" type="datetimeFigureOut">
               <a:rPr lang="en-US" smtClean="0"/>
-              <a:t>1/5/2014</a:t>
+              <a:t>1/5/14</a:t>
             </a:fld>
             <a:endParaRPr lang="en-US"/>
           </a:p>
@@ -2532,7 +2532,7 @@
           <a:p>
             <a:fld id="{A8FF2306-292D-41C8-8AE3-F53CB7571D2B}" type="datetimeFigureOut">
               <a:rPr lang="en-US" smtClean="0"/>
-              <a:t>1/5/2014</a:t>
+              <a:t>1/5/14</a:t>
             </a:fld>
             <a:endParaRPr lang="en-US"/>
           </a:p>
@@ -2785,7 +2785,7 @@
           <a:p>
             <a:fld id="{A8FF2306-292D-41C8-8AE3-F53CB7571D2B}" type="datetimeFigureOut">
               <a:rPr lang="en-US" smtClean="0"/>
-              <a:t>1/5/2014</a:t>
+              <a:t>1/5/14</a:t>
             </a:fld>
             <a:endParaRPr lang="en-US"/>
           </a:p>
@@ -2998,7 +2998,7 @@
           <a:p>
             <a:fld id="{A8FF2306-292D-41C8-8AE3-F53CB7571D2B}" type="datetimeFigureOut">
               <a:rPr lang="en-US" smtClean="0"/>
-              <a:t>1/5/2014</a:t>
+              <a:t>1/5/14</a:t>
             </a:fld>
             <a:endParaRPr lang="en-US"/>
           </a:p>
@@ -3519,7 +3519,29 @@
                 </a:effectLst>
                 <a:latin typeface="Helvetica" charset="0"/>
               </a:rPr>
-              <a:t>Rocket coprocessor for accelerating elliptic curve cryptography (specifically, ECDSA)</a:t>
+              <a:t>Coprocessor for accelerating </a:t>
+            </a:r>
+            <a:r>
+              <a:rPr lang="en-US" sz="5600" dirty="0" smtClean="0">
+                <a:effectLst>
+                  <a:outerShdw blurRad="38100" dist="38100" dir="2700000" algn="tl">
+                    <a:srgbClr val="C0C0C0"/>
+                  </a:outerShdw>
+                </a:effectLst>
+                <a:latin typeface="Helvetica" charset="0"/>
+              </a:rPr>
+              <a:t>elliptic curve </a:t>
+            </a:r>
+            <a:r>
+              <a:rPr lang="en-US" sz="5600" dirty="0" smtClean="0">
+                <a:effectLst>
+                  <a:outerShdw blurRad="38100" dist="38100" dir="2700000" algn="tl">
+                    <a:srgbClr val="C0C0C0"/>
+                  </a:outerShdw>
+                </a:effectLst>
+                <a:latin typeface="Helvetica" charset="0"/>
+              </a:rPr>
+              <a:t>cryptography, primarily for embedded devices</a:t>
             </a:r>
             <a:endParaRPr lang="en-US" sz="5600" dirty="0">
               <a:effectLst>
@@ -3701,7 +3723,7 @@
         </p:nvSpPr>
         <p:spPr bwMode="auto">
           <a:xfrm>
-            <a:off x="23993475" y="21143913"/>
+            <a:off x="23993475" y="20726400"/>
             <a:ext cx="7793038" cy="1138237"/>
           </a:xfrm>
           <a:prstGeom prst="roundRect">
@@ -3754,7 +3776,7 @@
         </p:nvSpPr>
         <p:spPr bwMode="auto">
           <a:xfrm>
-            <a:off x="646113" y="23006050"/>
+            <a:off x="817562" y="22098000"/>
             <a:ext cx="7793038" cy="1138237"/>
           </a:xfrm>
           <a:prstGeom prst="roundRect">
@@ -3860,7 +3882,7 @@
         </p:nvSpPr>
         <p:spPr bwMode="auto">
           <a:xfrm>
-            <a:off x="646113" y="12309475"/>
+            <a:off x="914400" y="11811000"/>
             <a:ext cx="7793037" cy="1138238"/>
           </a:xfrm>
           <a:prstGeom prst="roundRect">
@@ -3966,8 +3988,8 @@
         </p:nvSpPr>
         <p:spPr bwMode="auto">
           <a:xfrm>
-            <a:off x="206375" y="7134225"/>
-            <a:ext cx="9434513" cy="5690789"/>
+            <a:off x="547687" y="7134225"/>
+            <a:ext cx="9434513" cy="5236306"/>
           </a:xfrm>
           <a:prstGeom prst="rect">
             <a:avLst/>
@@ -3977,14 +3999,14 @@
             <a:noFill/>
           </a:ln>
           <a:extLst>
-            <a:ext uri="{909E8E84-426E-40DD-AFC4-6F175D3DCCD1}">
+            <a:ext uri="{909E8E84-426E-40dd-AFC4-6F175D3DCCD1}">
               <a14:hiddenFill xmlns:a14="http://schemas.microsoft.com/office/drawing/2010/main">
                 <a:solidFill>
                   <a:srgbClr val="FFFFFF"/>
                 </a:solidFill>
               </a14:hiddenFill>
             </a:ext>
-            <a:ext uri="{91240B29-F687-4F45-9708-019B960494DF}">
+            <a:ext uri="{91240B29-F687-4f45-9708-019B960494DF}">
               <a14:hiddenLine xmlns:a14="http://schemas.microsoft.com/office/drawing/2010/main" w="9525">
                 <a:solidFill>
                   <a:srgbClr val="000000"/>
@@ -4188,28 +4210,15 @@
                 <a:effectLst/>
                 <a:latin typeface="Helvetica" charset="0"/>
               </a:rPr>
-              <a:t>Private: only the owner knows this</a:t>
-            </a:r>
-            <a:endParaRPr lang="en-US" sz="2600" dirty="0">
-              <a:effectLst/>
-              <a:latin typeface="Helvetica" charset="0"/>
-            </a:endParaRPr>
-          </a:p>
-          <a:p>
-            <a:pPr lvl="1">
-              <a:lnSpc>
-                <a:spcPct val="80000"/>
-              </a:lnSpc>
-              <a:spcBef>
-                <a:spcPct val="15000"/>
-              </a:spcBef>
-              <a:buClr>
-                <a:schemeClr val="accent1"/>
-              </a:buClr>
-              <a:buSzPct val="75000"/>
-              <a:buFont typeface="Wingdings" charset="2"/>
-              <a:buChar char="o"/>
-            </a:pPr>
+              <a:t>Private: only the owner knows </a:t>
+            </a:r>
+            <a:r>
+              <a:rPr lang="en-US" sz="2600" dirty="0" smtClean="0">
+                <a:effectLst/>
+                <a:latin typeface="Helvetica" charset="0"/>
+              </a:rPr>
+              <a:t>this</a:t>
+            </a:r>
             <a:endParaRPr lang="en-US" sz="3200" dirty="0">
               <a:effectLst/>
               <a:latin typeface="Helvetica" charset="0"/>
@@ -4644,7 +4653,7 @@
         </p:nvSpPr>
         <p:spPr bwMode="auto">
           <a:xfrm>
-            <a:off x="12642850" y="13738233"/>
+            <a:off x="12642850" y="13873163"/>
             <a:ext cx="7793037" cy="1138237"/>
           </a:xfrm>
           <a:prstGeom prst="roundRect">
@@ -4752,7 +4761,7 @@
             </p:nvSpPr>
             <p:spPr bwMode="auto">
               <a:xfrm>
-                <a:off x="588963" y="14090650"/>
+                <a:off x="623888" y="13258800"/>
                 <a:ext cx="9434512" cy="2562240"/>
               </a:xfrm>
               <a:prstGeom prst="rect">
@@ -4763,14 +4772,14 @@
                 <a:noFill/>
               </a:ln>
               <a:extLst>
-                <a:ext uri="{909E8E84-426E-40DD-AFC4-6F175D3DCCD1}">
+                <a:ext uri="{909E8E84-426E-40dd-AFC4-6F175D3DCCD1}">
                   <a14:hiddenFill>
                     <a:solidFill>
                       <a:srgbClr val="FFFFFF"/>
                     </a:solidFill>
                   </a14:hiddenFill>
                 </a:ext>
-                <a:ext uri="{91240B29-F687-4F45-9708-019B960494DF}">
+                <a:ext uri="{91240B29-F687-4f45-9708-019B960494DF}">
                   <a14:hiddenLine w="9525">
                     <a:solidFill>
                       <a:srgbClr val="000000"/>
@@ -4932,7 +4941,7 @@
                   <a:buChar char="o"/>
                 </a:pPr>
                 <a14:m>
-                  <m:oMath xmlns:m="http://schemas.openxmlformats.org/officeDocument/2006/math">
+                  <m:oMath xmlns:m="http://schemas.openxmlformats.org/officeDocument/2006/math" xmlns="">
                     <m:sSup>
                       <m:sSupPr>
                         <m:ctrlPr>
@@ -5124,7 +5133,7 @@
             </p:nvSpPr>
             <p:spPr bwMode="auto">
               <a:xfrm>
-                <a:off x="588963" y="14090650"/>
+                <a:off x="623888" y="13258800"/>
                 <a:ext cx="9434512" cy="2562240"/>
               </a:xfrm>
               <a:prstGeom prst="rect">
@@ -5133,21 +5142,21 @@
               <a:blipFill rotWithShape="1">
                 <a:blip r:embed="rId3"/>
                 <a:stretch>
-                  <a:fillRect l="-905" t="-6888"/>
+                  <a:fillRect/>
                 </a:stretch>
               </a:blipFill>
               <a:ln>
                 <a:noFill/>
               </a:ln>
               <a:extLst>
-                <a:ext uri="{909E8E84-426E-40DD-AFC4-6F175D3DCCD1}">
+                <a:ext uri="{909E8E84-426E-40dd-AFC4-6F175D3DCCD1}">
                   <a14:hiddenFill xmlns:a14="http://schemas.microsoft.com/office/drawing/2010/main">
                     <a:solidFill>
                       <a:srgbClr val="FFFFFF"/>
                     </a:solidFill>
                   </a14:hiddenFill>
                 </a:ext>
-                <a:ext uri="{91240B29-F687-4F45-9708-019B960494DF}">
+                <a:ext uri="{91240B29-F687-4f45-9708-019B960494DF}">
                   <a14:hiddenLine xmlns:a14="http://schemas.microsoft.com/office/drawing/2010/main" w="9525">
                     <a:solidFill>
                       <a:srgbClr val="000000"/>
@@ -5186,7 +5195,7 @@
             </p:nvSpPr>
             <p:spPr bwMode="auto">
               <a:xfrm>
-                <a:off x="398463" y="24609425"/>
+                <a:off x="533400" y="23469600"/>
                 <a:ext cx="9434512" cy="2094420"/>
               </a:xfrm>
               <a:prstGeom prst="rect">
@@ -5197,14 +5206,14 @@
                 <a:noFill/>
               </a:ln>
               <a:extLst>
-                <a:ext uri="{909E8E84-426E-40DD-AFC4-6F175D3DCCD1}">
+                <a:ext uri="{909E8E84-426E-40dd-AFC4-6F175D3DCCD1}">
                   <a14:hiddenFill>
                     <a:solidFill>
                       <a:srgbClr val="FFFFFF"/>
                     </a:solidFill>
                   </a14:hiddenFill>
                 </a:ext>
-                <a:ext uri="{91240B29-F687-4F45-9708-019B960494DF}">
+                <a:ext uri="{91240B29-F687-4f45-9708-019B960494DF}">
                   <a14:hiddenLine w="9525">
                     <a:solidFill>
                       <a:srgbClr val="000000"/>
@@ -5343,7 +5352,7 @@
                   <a:buChar char="o"/>
                 </a:pPr>
                 <a14:m>
-                  <m:oMath xmlns:m="http://schemas.openxmlformats.org/officeDocument/2006/math">
+                  <m:oMath xmlns:m="http://schemas.openxmlformats.org/officeDocument/2006/math" xmlns="">
                     <m:sSup>
                       <m:sSupPr>
                         <m:ctrlPr>
@@ -5416,7 +5425,7 @@
                   <a:t>Difficult in one direction (given </a:t>
                 </a:r>
                 <a14:m>
-                  <m:oMath xmlns:m="http://schemas.openxmlformats.org/officeDocument/2006/math">
+                  <m:oMath xmlns:m="http://schemas.openxmlformats.org/officeDocument/2006/math" xmlns="">
                     <m:r>
                       <a:rPr lang="en-US" sz="2600" i="1" dirty="0" smtClean="0">
                         <a:effectLst/>
@@ -5434,7 +5443,7 @@
                   <a:t> and </a:t>
                 </a:r>
                 <a14:m>
-                  <m:oMath xmlns:m="http://schemas.openxmlformats.org/officeDocument/2006/math">
+                  <m:oMath xmlns:m="http://schemas.openxmlformats.org/officeDocument/2006/math" xmlns="">
                     <m:r>
                       <a:rPr lang="en-US" sz="2600" i="1" dirty="0" smtClean="0">
                         <a:effectLst/>
@@ -5452,7 +5461,7 @@
                   <a:t> find </a:t>
                 </a:r>
                 <a14:m>
-                  <m:oMath xmlns:m="http://schemas.openxmlformats.org/officeDocument/2006/math">
+                  <m:oMath xmlns:m="http://schemas.openxmlformats.org/officeDocument/2006/math" xmlns="">
                     <m:r>
                       <a:rPr lang="en-US" sz="2600" i="1" dirty="0" smtClean="0">
                         <a:effectLst/>
@@ -5497,7 +5506,7 @@
                   <a:t>Easy in the other direction (given </a:t>
                 </a:r>
                 <a14:m>
-                  <m:oMath xmlns:m="http://schemas.openxmlformats.org/officeDocument/2006/math">
+                  <m:oMath xmlns:m="http://schemas.openxmlformats.org/officeDocument/2006/math" xmlns="">
                     <m:r>
                       <a:rPr lang="en-US" sz="2600" i="1" dirty="0" smtClean="0">
                         <a:effectLst/>
@@ -5515,7 +5524,7 @@
                   <a:t> and </a:t>
                 </a:r>
                 <a14:m>
-                  <m:oMath xmlns:m="http://schemas.openxmlformats.org/officeDocument/2006/math">
+                  <m:oMath xmlns:m="http://schemas.openxmlformats.org/officeDocument/2006/math" xmlns="">
                     <m:r>
                       <a:rPr lang="en-US" sz="2600" i="1" dirty="0" smtClean="0">
                         <a:effectLst/>
@@ -5533,7 +5542,7 @@
                   <a:t> find </a:t>
                 </a:r>
                 <a14:m>
-                  <m:oMath xmlns:m="http://schemas.openxmlformats.org/officeDocument/2006/math">
+                  <m:oMath xmlns:m="http://schemas.openxmlformats.org/officeDocument/2006/math" xmlns="">
                     <m:r>
                       <a:rPr lang="en-US" sz="2600" i="1" dirty="0" smtClean="0">
                         <a:effectLst/>
@@ -5606,7 +5615,7 @@
             </p:nvSpPr>
             <p:spPr bwMode="auto">
               <a:xfrm>
-                <a:off x="398463" y="24609425"/>
+                <a:off x="533400" y="23469600"/>
                 <a:ext cx="9434512" cy="2094420"/>
               </a:xfrm>
               <a:prstGeom prst="rect">
@@ -5615,21 +5624,21 @@
               <a:blipFill rotWithShape="1">
                 <a:blip r:embed="rId4"/>
                 <a:stretch>
-                  <a:fillRect l="-840" b="-8430"/>
+                  <a:fillRect t="-2326" b="-2907"/>
                 </a:stretch>
               </a:blipFill>
               <a:ln>
                 <a:noFill/>
               </a:ln>
               <a:extLst>
-                <a:ext uri="{909E8E84-426E-40DD-AFC4-6F175D3DCCD1}">
+                <a:ext uri="{909E8E84-426E-40dd-AFC4-6F175D3DCCD1}">
                   <a14:hiddenFill xmlns:a14="http://schemas.microsoft.com/office/drawing/2010/main">
                     <a:solidFill>
                       <a:srgbClr val="FFFFFF"/>
                     </a:solidFill>
                   </a14:hiddenFill>
                 </a:ext>
-                <a:ext uri="{91240B29-F687-4F45-9708-019B960494DF}">
+                <a:ext uri="{91240B29-F687-4f45-9708-019B960494DF}">
                   <a14:hiddenLine xmlns:a14="http://schemas.microsoft.com/office/drawing/2010/main" w="9525">
                     <a:solidFill>
                       <a:srgbClr val="000000"/>
@@ -5666,7 +5675,7 @@
         </p:nvSpPr>
         <p:spPr bwMode="auto">
           <a:xfrm>
-            <a:off x="24101425" y="13654088"/>
+            <a:off x="24245887" y="13182600"/>
             <a:ext cx="9434513" cy="2386807"/>
           </a:xfrm>
           <a:prstGeom prst="rect">
@@ -5677,14 +5686,14 @@
             <a:noFill/>
           </a:ln>
           <a:extLst>
-            <a:ext uri="{909E8E84-426E-40DD-AFC4-6F175D3DCCD1}">
+            <a:ext uri="{909E8E84-426E-40dd-AFC4-6F175D3DCCD1}">
               <a14:hiddenFill xmlns:a14="http://schemas.microsoft.com/office/drawing/2010/main">
                 <a:solidFill>
                   <a:srgbClr val="FFFFFF"/>
                 </a:solidFill>
               </a14:hiddenFill>
             </a:ext>
-            <a:ext uri="{91240B29-F687-4F45-9708-019B960494DF}">
+            <a:ext uri="{91240B29-F687-4f45-9708-019B960494DF}">
               <a14:hiddenLine xmlns:a14="http://schemas.microsoft.com/office/drawing/2010/main" w="9525">
                 <a:solidFill>
                   <a:srgbClr val="000000"/>
@@ -5960,7 +5969,7 @@
             </p:nvSpPr>
             <p:spPr bwMode="auto">
               <a:xfrm>
-                <a:off x="12039600" y="7545388"/>
+                <a:off x="12039600" y="7086600"/>
                 <a:ext cx="10231064" cy="2591607"/>
               </a:xfrm>
               <a:prstGeom prst="rect">
@@ -5971,14 +5980,14 @@
                 <a:noFill/>
               </a:ln>
               <a:extLst>
-                <a:ext uri="{909E8E84-426E-40DD-AFC4-6F175D3DCCD1}">
+                <a:ext uri="{909E8E84-426E-40dd-AFC4-6F175D3DCCD1}">
                   <a14:hiddenFill>
                     <a:solidFill>
                       <a:srgbClr val="FFFFFF"/>
                     </a:solidFill>
                   </a14:hiddenFill>
                 </a:ext>
-                <a:ext uri="{91240B29-F687-4F45-9708-019B960494DF}">
+                <a:ext uri="{91240B29-F687-4f45-9708-019B960494DF}">
                   <a14:hiddenLine w="9525">
                     <a:solidFill>
                       <a:srgbClr val="000000"/>
@@ -6144,7 +6153,7 @@
                   <a:buChar char="o"/>
                 </a:pPr>
                 <a14:m>
-                  <m:oMath xmlns:m="http://schemas.openxmlformats.org/officeDocument/2006/math">
+                  <m:oMath xmlns:m="http://schemas.openxmlformats.org/officeDocument/2006/math" xmlns="">
                     <m:sSup>
                       <m:sSupPr>
                         <m:ctrlPr>
@@ -6232,7 +6241,7 @@
                   <a:buChar char="o"/>
                 </a:pPr>
                 <a14:m>
-                  <m:oMath xmlns:m="http://schemas.openxmlformats.org/officeDocument/2006/math">
+                  <m:oMath xmlns:m="http://schemas.openxmlformats.org/officeDocument/2006/math" xmlns="">
                     <m:r>
                       <a:rPr lang="en-US" sz="2600" b="0" i="1" smtClean="0">
                         <a:effectLst/>
@@ -6354,7 +6363,7 @@
             </p:nvSpPr>
             <p:spPr bwMode="auto">
               <a:xfrm>
-                <a:off x="12039600" y="7545388"/>
+                <a:off x="12039600" y="7086600"/>
                 <a:ext cx="10231064" cy="2591607"/>
               </a:xfrm>
               <a:prstGeom prst="rect">
@@ -6363,21 +6372,21 @@
               <a:blipFill rotWithShape="1">
                 <a:blip r:embed="rId5"/>
                 <a:stretch>
-                  <a:fillRect l="-775" t="-6824"/>
+                  <a:fillRect b="-2347"/>
                 </a:stretch>
               </a:blipFill>
               <a:ln>
                 <a:noFill/>
               </a:ln>
               <a:extLst>
-                <a:ext uri="{909E8E84-426E-40DD-AFC4-6F175D3DCCD1}">
+                <a:ext uri="{909E8E84-426E-40dd-AFC4-6F175D3DCCD1}">
                   <a14:hiddenFill xmlns:a14="http://schemas.microsoft.com/office/drawing/2010/main">
                     <a:solidFill>
                       <a:srgbClr val="FFFFFF"/>
                     </a:solidFill>
                   </a14:hiddenFill>
                 </a:ext>
-                <a:ext uri="{91240B29-F687-4F45-9708-019B960494DF}">
+                <a:ext uri="{91240B29-F687-4f45-9708-019B960494DF}">
                   <a14:hiddenLine xmlns:a14="http://schemas.microsoft.com/office/drawing/2010/main" w="9525">
                     <a:solidFill>
                       <a:srgbClr val="000000"/>
@@ -6565,7 +6574,7 @@
         </p:blipFill>
         <p:spPr>
           <a:xfrm>
-            <a:off x="1270350" y="16629262"/>
+            <a:off x="1365600" y="15392400"/>
             <a:ext cx="6025800" cy="5932288"/>
           </a:xfrm>
           <a:prstGeom prst="rect">
@@ -6595,7 +6604,7 @@
         </p:blipFill>
         <p:spPr>
           <a:xfrm>
-            <a:off x="12814299" y="10136995"/>
+            <a:off x="12879368" y="10126312"/>
             <a:ext cx="7923232" cy="3056288"/>
           </a:xfrm>
           <a:prstGeom prst="rect">
@@ -6625,7 +6634,7 @@
         </p:blipFill>
         <p:spPr>
           <a:xfrm>
-            <a:off x="11049000" y="15353489"/>
+            <a:off x="11049000" y="15087600"/>
             <a:ext cx="4390040" cy="5612624"/>
           </a:xfrm>
           <a:prstGeom prst="rect">
@@ -6655,7 +6664,7 @@
         </p:blipFill>
         <p:spPr>
           <a:xfrm>
-            <a:off x="17186275" y="15116967"/>
+            <a:off x="17186275" y="15087600"/>
             <a:ext cx="3708464" cy="6557964"/>
           </a:xfrm>
           <a:prstGeom prst="rect">
@@ -6685,7 +6694,7 @@
         </p:blipFill>
         <p:spPr>
           <a:xfrm>
-            <a:off x="11607033" y="21778118"/>
+            <a:off x="11607033" y="22544764"/>
             <a:ext cx="10058400" cy="4125236"/>
           </a:xfrm>
           <a:prstGeom prst="rect">
@@ -6715,7 +6724,7 @@
         </p:blipFill>
         <p:spPr>
           <a:xfrm>
-            <a:off x="25009475" y="22866350"/>
+            <a:off x="25009475" y="22098000"/>
             <a:ext cx="5761038" cy="4101894"/>
           </a:xfrm>
           <a:prstGeom prst="rect">
@@ -6786,7 +6795,7 @@
         </p:nvSpPr>
         <p:spPr bwMode="auto">
           <a:xfrm>
-            <a:off x="24253825" y="7586678"/>
+            <a:off x="24253825" y="7315200"/>
             <a:ext cx="9434513" cy="5222968"/>
           </a:xfrm>
           <a:prstGeom prst="rect">
@@ -6797,14 +6806,14 @@
             <a:noFill/>
           </a:ln>
           <a:extLst>
-            <a:ext uri="{909E8E84-426E-40DD-AFC4-6F175D3DCCD1}">
+            <a:ext uri="{909E8E84-426E-40dd-AFC4-6F175D3DCCD1}">
               <a14:hiddenFill xmlns:a14="http://schemas.microsoft.com/office/drawing/2010/main">
                 <a:solidFill>
                   <a:srgbClr val="FFFFFF"/>
                 </a:solidFill>
               </a14:hiddenFill>
             </a:ext>
-            <a:ext uri="{91240B29-F687-4F45-9708-019B960494DF}">
+            <a:ext uri="{91240B29-F687-4f45-9708-019B960494DF}">
               <a14:hiddenLine xmlns:a14="http://schemas.microsoft.com/office/drawing/2010/main" w="9525">
                 <a:solidFill>
                   <a:srgbClr val="000000"/>
@@ -7097,7 +7106,21 @@
                 <a:effectLst/>
                 <a:latin typeface="Helvetica" charset="0"/>
               </a:rPr>
-              <a:t>Operations can be selection for hardware</a:t>
+              <a:t>Operations can be </a:t>
+            </a:r>
+            <a:r>
+              <a:rPr lang="en-US" sz="2600" dirty="0" smtClean="0">
+                <a:effectLst/>
+                <a:latin typeface="Helvetica" charset="0"/>
+              </a:rPr>
+              <a:t>selected </a:t>
+            </a:r>
+            <a:r>
+              <a:rPr lang="en-US" sz="2600" dirty="0" smtClean="0">
+                <a:effectLst/>
+                <a:latin typeface="Helvetica" charset="0"/>
+              </a:rPr>
+              <a:t>for hardware</a:t>
             </a:r>
           </a:p>
           <a:p>
@@ -7161,17 +7184,8 @@
               <a:rPr lang="en-US" sz="2600" dirty="0" smtClean="0">
                 <a:latin typeface="Helvetica" charset="0"/>
               </a:rPr>
-              <a:t>Easy thanks </a:t>
-            </a:r>
-            <a:r>
-              <a:rPr lang="en-US" sz="2600" smtClean="0">
-                <a:latin typeface="Helvetica" charset="0"/>
-              </a:rPr>
-              <a:t>to Chisel!</a:t>
-            </a:r>
-            <a:endParaRPr lang="en-US" sz="2600" dirty="0" smtClean="0">
-              <a:latin typeface="Helvetica" charset="0"/>
-            </a:endParaRPr>
+              <a:t>Easy thanks to Chisel!</a:t>
+            </a:r>
           </a:p>
           <a:p>
             <a:pPr>
@@ -7255,7 +7269,7 @@
         </p:blipFill>
         <p:spPr>
           <a:xfrm>
-            <a:off x="25487782" y="15353489"/>
+            <a:off x="25487782" y="14401800"/>
             <a:ext cx="4804424" cy="5252938"/>
           </a:xfrm>
           <a:prstGeom prst="rect">
@@ -7263,6 +7277,1640 @@
           </a:prstGeom>
         </p:spPr>
       </p:pic>
+      <p:sp>
+        <p:nvSpPr>
+          <p:cNvPr id="32" name="Text Box 1383"/>
+          <p:cNvSpPr txBox="1">
+            <a:spLocks noChangeArrowheads="1"/>
+          </p:cNvSpPr>
+          <p:nvPr/>
+        </p:nvSpPr>
+        <p:spPr bwMode="auto">
+          <a:xfrm>
+            <a:off x="533400" y="25831800"/>
+            <a:ext cx="9434513" cy="1259832"/>
+          </a:xfrm>
+          <a:prstGeom prst="rect">
+            <a:avLst/>
+          </a:prstGeom>
+          <a:noFill/>
+          <a:ln>
+            <a:noFill/>
+          </a:ln>
+          <a:extLst>
+            <a:ext uri="{909E8E84-426E-40dd-AFC4-6F175D3DCCD1}">
+              <a14:hiddenFill xmlns:a14="http://schemas.microsoft.com/office/drawing/2010/main">
+                <a:solidFill>
+                  <a:srgbClr val="FFFFFF"/>
+                </a:solidFill>
+              </a14:hiddenFill>
+            </a:ext>
+            <a:ext uri="{91240B29-F687-4f45-9708-019B960494DF}">
+              <a14:hiddenLine xmlns:a14="http://schemas.microsoft.com/office/drawing/2010/main" w="9525">
+                <a:solidFill>
+                  <a:srgbClr val="000000"/>
+                </a:solidFill>
+                <a:miter lim="800000"/>
+                <a:headEnd/>
+                <a:tailEnd/>
+              </a14:hiddenLine>
+            </a:ext>
+          </a:extLst>
+        </p:spPr>
+        <p:txBody>
+          <a:bodyPr>
+            <a:spAutoFit/>
+          </a:bodyPr>
+          <a:lstStyle>
+            <a:lvl1pPr marL="457200" indent="-457200">
+              <a:defRPr sz="3000">
+                <a:solidFill>
+                  <a:schemeClr val="tx1"/>
+                </a:solidFill>
+                <a:latin typeface="Times" charset="0"/>
+                <a:ea typeface="ＭＳ Ｐゴシック" charset="-128"/>
+              </a:defRPr>
+            </a:lvl1pPr>
+            <a:lvl2pPr marL="1092200" indent="-393700">
+              <a:defRPr sz="3000">
+                <a:solidFill>
+                  <a:schemeClr val="tx1"/>
+                </a:solidFill>
+                <a:latin typeface="Times" charset="0"/>
+                <a:ea typeface="ＭＳ Ｐゴシック" charset="-128"/>
+              </a:defRPr>
+            </a:lvl2pPr>
+            <a:lvl3pPr>
+              <a:defRPr sz="3000">
+                <a:solidFill>
+                  <a:schemeClr val="tx1"/>
+                </a:solidFill>
+                <a:latin typeface="Times" charset="0"/>
+                <a:ea typeface="ＭＳ Ｐゴシック" charset="-128"/>
+              </a:defRPr>
+            </a:lvl3pPr>
+            <a:lvl4pPr>
+              <a:defRPr sz="3000">
+                <a:solidFill>
+                  <a:schemeClr val="tx1"/>
+                </a:solidFill>
+                <a:latin typeface="Times" charset="0"/>
+                <a:ea typeface="ＭＳ Ｐゴシック" charset="-128"/>
+              </a:defRPr>
+            </a:lvl4pPr>
+            <a:lvl5pPr>
+              <a:defRPr sz="3000">
+                <a:solidFill>
+                  <a:schemeClr val="tx1"/>
+                </a:solidFill>
+                <a:latin typeface="Times" charset="0"/>
+                <a:ea typeface="ＭＳ Ｐゴシック" charset="-128"/>
+              </a:defRPr>
+            </a:lvl5pPr>
+            <a:lvl6pPr marL="457200" eaLnBrk="0" fontAlgn="base" hangingPunct="0">
+              <a:spcBef>
+                <a:spcPct val="0"/>
+              </a:spcBef>
+              <a:spcAft>
+                <a:spcPct val="0"/>
+              </a:spcAft>
+              <a:defRPr sz="3000">
+                <a:solidFill>
+                  <a:schemeClr val="tx1"/>
+                </a:solidFill>
+                <a:latin typeface="Times" charset="0"/>
+                <a:ea typeface="ＭＳ Ｐゴシック" charset="-128"/>
+              </a:defRPr>
+            </a:lvl6pPr>
+            <a:lvl7pPr marL="914400" eaLnBrk="0" fontAlgn="base" hangingPunct="0">
+              <a:spcBef>
+                <a:spcPct val="0"/>
+              </a:spcBef>
+              <a:spcAft>
+                <a:spcPct val="0"/>
+              </a:spcAft>
+              <a:defRPr sz="3000">
+                <a:solidFill>
+                  <a:schemeClr val="tx1"/>
+                </a:solidFill>
+                <a:latin typeface="Times" charset="0"/>
+                <a:ea typeface="ＭＳ Ｐゴシック" charset="-128"/>
+              </a:defRPr>
+            </a:lvl7pPr>
+            <a:lvl8pPr marL="1371600" eaLnBrk="0" fontAlgn="base" hangingPunct="0">
+              <a:spcBef>
+                <a:spcPct val="0"/>
+              </a:spcBef>
+              <a:spcAft>
+                <a:spcPct val="0"/>
+              </a:spcAft>
+              <a:defRPr sz="3000">
+                <a:solidFill>
+                  <a:schemeClr val="tx1"/>
+                </a:solidFill>
+                <a:latin typeface="Times" charset="0"/>
+                <a:ea typeface="ＭＳ Ｐゴシック" charset="-128"/>
+              </a:defRPr>
+            </a:lvl8pPr>
+            <a:lvl9pPr marL="1828800" eaLnBrk="0" fontAlgn="base" hangingPunct="0">
+              <a:spcBef>
+                <a:spcPct val="0"/>
+              </a:spcBef>
+              <a:spcAft>
+                <a:spcPct val="0"/>
+              </a:spcAft>
+              <a:defRPr sz="3000">
+                <a:solidFill>
+                  <a:schemeClr val="tx1"/>
+                </a:solidFill>
+                <a:latin typeface="Times" charset="0"/>
+                <a:ea typeface="ＭＳ Ｐゴシック" charset="-128"/>
+              </a:defRPr>
+            </a:lvl9pPr>
+          </a:lstStyle>
+          <a:p>
+            <a:pPr>
+              <a:lnSpc>
+                <a:spcPct val="80000"/>
+              </a:lnSpc>
+              <a:spcBef>
+                <a:spcPct val="15000"/>
+              </a:spcBef>
+              <a:buClr>
+                <a:schemeClr val="accent1"/>
+              </a:buClr>
+              <a:buSzPct val="75000"/>
+              <a:buFont typeface="Wingdings" charset="2"/>
+              <a:buChar char="o"/>
+            </a:pPr>
+            <a:r>
+              <a:rPr lang="en-US" sz="3200" dirty="0" smtClean="0">
+                <a:effectLst/>
+                <a:latin typeface="Helvetica" charset="0"/>
+              </a:rPr>
+              <a:t>ECC </a:t>
+            </a:r>
+            <a:r>
+              <a:rPr lang="en-US" sz="3200" dirty="0" smtClean="0">
+                <a:latin typeface="Helvetica" charset="0"/>
+              </a:rPr>
+              <a:t>equivalent is a point multiply</a:t>
+            </a:r>
+            <a:endParaRPr lang="en-US" sz="2600" dirty="0">
+              <a:effectLst/>
+              <a:latin typeface="Helvetica" charset="0"/>
+            </a:endParaRPr>
+          </a:p>
+          <a:p>
+            <a:pPr lvl="1">
+              <a:lnSpc>
+                <a:spcPct val="80000"/>
+              </a:lnSpc>
+              <a:spcBef>
+                <a:spcPct val="15000"/>
+              </a:spcBef>
+              <a:buClr>
+                <a:schemeClr val="accent2"/>
+              </a:buClr>
+              <a:buSzPct val="75000"/>
+              <a:buFont typeface="Wingdings" charset="2"/>
+              <a:buChar char="o"/>
+            </a:pPr>
+            <a:endParaRPr lang="en-US" sz="2600" dirty="0">
+              <a:effectLst/>
+              <a:latin typeface="Helvetica" charset="0"/>
+            </a:endParaRPr>
+          </a:p>
+          <a:p>
+            <a:pPr lvl="1">
+              <a:lnSpc>
+                <a:spcPct val="80000"/>
+              </a:lnSpc>
+              <a:spcBef>
+                <a:spcPct val="15000"/>
+              </a:spcBef>
+              <a:buClr>
+                <a:schemeClr val="accent1"/>
+              </a:buClr>
+              <a:buSzPct val="75000"/>
+            </a:pPr>
+            <a:endParaRPr lang="en-US" sz="2600" dirty="0">
+              <a:effectLst/>
+              <a:latin typeface="Helvetica" charset="0"/>
+            </a:endParaRPr>
+          </a:p>
+        </p:txBody>
+      </p:sp>
+      <p:sp>
+        <p:nvSpPr>
+          <p:cNvPr id="37" name="Text Box 1383"/>
+          <p:cNvSpPr txBox="1">
+            <a:spLocks noChangeArrowheads="1"/>
+          </p:cNvSpPr>
+          <p:nvPr/>
+        </p:nvSpPr>
+        <p:spPr bwMode="auto">
+          <a:xfrm>
+            <a:off x="12039600" y="9408168"/>
+            <a:ext cx="9829800" cy="1259832"/>
+          </a:xfrm>
+          <a:prstGeom prst="rect">
+            <a:avLst/>
+          </a:prstGeom>
+          <a:noFill/>
+          <a:ln>
+            <a:noFill/>
+          </a:ln>
+          <a:extLst>
+            <a:ext uri="{909E8E84-426E-40dd-AFC4-6F175D3DCCD1}">
+              <a14:hiddenFill xmlns:a14="http://schemas.microsoft.com/office/drawing/2010/main">
+                <a:solidFill>
+                  <a:srgbClr val="FFFFFF"/>
+                </a:solidFill>
+              </a14:hiddenFill>
+            </a:ext>
+            <a:ext uri="{91240B29-F687-4f45-9708-019B960494DF}">
+              <a14:hiddenLine xmlns:a14="http://schemas.microsoft.com/office/drawing/2010/main" w="9525">
+                <a:solidFill>
+                  <a:srgbClr val="000000"/>
+                </a:solidFill>
+                <a:miter lim="800000"/>
+                <a:headEnd/>
+                <a:tailEnd/>
+              </a14:hiddenLine>
+            </a:ext>
+          </a:extLst>
+        </p:spPr>
+        <p:txBody>
+          <a:bodyPr wrap="square">
+            <a:spAutoFit/>
+          </a:bodyPr>
+          <a:lstStyle>
+            <a:lvl1pPr marL="457200" indent="-457200">
+              <a:defRPr sz="3000">
+                <a:solidFill>
+                  <a:schemeClr val="tx1"/>
+                </a:solidFill>
+                <a:latin typeface="Times" charset="0"/>
+                <a:ea typeface="ＭＳ Ｐゴシック" charset="-128"/>
+              </a:defRPr>
+            </a:lvl1pPr>
+            <a:lvl2pPr marL="1092200" indent="-393700">
+              <a:defRPr sz="3000">
+                <a:solidFill>
+                  <a:schemeClr val="tx1"/>
+                </a:solidFill>
+                <a:latin typeface="Times" charset="0"/>
+                <a:ea typeface="ＭＳ Ｐゴシック" charset="-128"/>
+              </a:defRPr>
+            </a:lvl2pPr>
+            <a:lvl3pPr>
+              <a:defRPr sz="3000">
+                <a:solidFill>
+                  <a:schemeClr val="tx1"/>
+                </a:solidFill>
+                <a:latin typeface="Times" charset="0"/>
+                <a:ea typeface="ＭＳ Ｐゴシック" charset="-128"/>
+              </a:defRPr>
+            </a:lvl3pPr>
+            <a:lvl4pPr>
+              <a:defRPr sz="3000">
+                <a:solidFill>
+                  <a:schemeClr val="tx1"/>
+                </a:solidFill>
+                <a:latin typeface="Times" charset="0"/>
+                <a:ea typeface="ＭＳ Ｐゴシック" charset="-128"/>
+              </a:defRPr>
+            </a:lvl4pPr>
+            <a:lvl5pPr>
+              <a:defRPr sz="3000">
+                <a:solidFill>
+                  <a:schemeClr val="tx1"/>
+                </a:solidFill>
+                <a:latin typeface="Times" charset="0"/>
+                <a:ea typeface="ＭＳ Ｐゴシック" charset="-128"/>
+              </a:defRPr>
+            </a:lvl5pPr>
+            <a:lvl6pPr marL="457200" eaLnBrk="0" fontAlgn="base" hangingPunct="0">
+              <a:spcBef>
+                <a:spcPct val="0"/>
+              </a:spcBef>
+              <a:spcAft>
+                <a:spcPct val="0"/>
+              </a:spcAft>
+              <a:defRPr sz="3000">
+                <a:solidFill>
+                  <a:schemeClr val="tx1"/>
+                </a:solidFill>
+                <a:latin typeface="Times" charset="0"/>
+                <a:ea typeface="ＭＳ Ｐゴシック" charset="-128"/>
+              </a:defRPr>
+            </a:lvl6pPr>
+            <a:lvl7pPr marL="914400" eaLnBrk="0" fontAlgn="base" hangingPunct="0">
+              <a:spcBef>
+                <a:spcPct val="0"/>
+              </a:spcBef>
+              <a:spcAft>
+                <a:spcPct val="0"/>
+              </a:spcAft>
+              <a:defRPr sz="3000">
+                <a:solidFill>
+                  <a:schemeClr val="tx1"/>
+                </a:solidFill>
+                <a:latin typeface="Times" charset="0"/>
+                <a:ea typeface="ＭＳ Ｐゴシック" charset="-128"/>
+              </a:defRPr>
+            </a:lvl7pPr>
+            <a:lvl8pPr marL="1371600" eaLnBrk="0" fontAlgn="base" hangingPunct="0">
+              <a:spcBef>
+                <a:spcPct val="0"/>
+              </a:spcBef>
+              <a:spcAft>
+                <a:spcPct val="0"/>
+              </a:spcAft>
+              <a:defRPr sz="3000">
+                <a:solidFill>
+                  <a:schemeClr val="tx1"/>
+                </a:solidFill>
+                <a:latin typeface="Times" charset="0"/>
+                <a:ea typeface="ＭＳ Ｐゴシック" charset="-128"/>
+              </a:defRPr>
+            </a:lvl8pPr>
+            <a:lvl9pPr marL="1828800" eaLnBrk="0" fontAlgn="base" hangingPunct="0">
+              <a:spcBef>
+                <a:spcPct val="0"/>
+              </a:spcBef>
+              <a:spcAft>
+                <a:spcPct val="0"/>
+              </a:spcAft>
+              <a:defRPr sz="3000">
+                <a:solidFill>
+                  <a:schemeClr val="tx1"/>
+                </a:solidFill>
+                <a:latin typeface="Times" charset="0"/>
+                <a:ea typeface="ＭＳ Ｐゴシック" charset="-128"/>
+              </a:defRPr>
+            </a:lvl9pPr>
+          </a:lstStyle>
+          <a:p>
+            <a:pPr>
+              <a:lnSpc>
+                <a:spcPct val="80000"/>
+              </a:lnSpc>
+              <a:spcBef>
+                <a:spcPct val="15000"/>
+              </a:spcBef>
+              <a:buClr>
+                <a:schemeClr val="accent1"/>
+              </a:buClr>
+              <a:buSzPct val="75000"/>
+              <a:buFont typeface="Wingdings" charset="2"/>
+              <a:buChar char="o"/>
+            </a:pPr>
+            <a:r>
+              <a:rPr lang="en-US" sz="3200" dirty="0" smtClean="0">
+                <a:effectLst/>
+                <a:latin typeface="Helvetica" charset="0"/>
+              </a:rPr>
+              <a:t>Smaller key sizes are great for embedded systems</a:t>
+            </a:r>
+            <a:endParaRPr lang="en-US" sz="2600" dirty="0">
+              <a:effectLst/>
+              <a:latin typeface="Helvetica" charset="0"/>
+            </a:endParaRPr>
+          </a:p>
+          <a:p>
+            <a:pPr lvl="1">
+              <a:lnSpc>
+                <a:spcPct val="80000"/>
+              </a:lnSpc>
+              <a:spcBef>
+                <a:spcPct val="15000"/>
+              </a:spcBef>
+              <a:buClr>
+                <a:schemeClr val="accent2"/>
+              </a:buClr>
+              <a:buSzPct val="75000"/>
+              <a:buFont typeface="Wingdings" charset="2"/>
+              <a:buChar char="o"/>
+            </a:pPr>
+            <a:endParaRPr lang="en-US" sz="2600" dirty="0">
+              <a:effectLst/>
+              <a:latin typeface="Helvetica" charset="0"/>
+            </a:endParaRPr>
+          </a:p>
+          <a:p>
+            <a:pPr lvl="1">
+              <a:lnSpc>
+                <a:spcPct val="80000"/>
+              </a:lnSpc>
+              <a:spcBef>
+                <a:spcPct val="15000"/>
+              </a:spcBef>
+              <a:buClr>
+                <a:schemeClr val="accent1"/>
+              </a:buClr>
+              <a:buSzPct val="75000"/>
+            </a:pPr>
+            <a:endParaRPr lang="en-US" sz="2600" dirty="0">
+              <a:effectLst/>
+              <a:latin typeface="Helvetica" charset="0"/>
+            </a:endParaRPr>
+          </a:p>
+        </p:txBody>
+      </p:sp>
+      <p:sp>
+        <p:nvSpPr>
+          <p:cNvPr id="39" name="Text Box 1383"/>
+          <p:cNvSpPr txBox="1">
+            <a:spLocks noChangeArrowheads="1"/>
+          </p:cNvSpPr>
+          <p:nvPr/>
+        </p:nvSpPr>
+        <p:spPr bwMode="auto">
+          <a:xfrm>
+            <a:off x="11506200" y="21717000"/>
+            <a:ext cx="9829800" cy="978217"/>
+          </a:xfrm>
+          <a:prstGeom prst="rect">
+            <a:avLst/>
+          </a:prstGeom>
+          <a:noFill/>
+          <a:ln>
+            <a:noFill/>
+          </a:ln>
+          <a:extLst>
+            <a:ext uri="{909E8E84-426E-40dd-AFC4-6F175D3DCCD1}">
+              <a14:hiddenFill xmlns:a14="http://schemas.microsoft.com/office/drawing/2010/main">
+                <a:solidFill>
+                  <a:srgbClr val="FFFFFF"/>
+                </a:solidFill>
+              </a14:hiddenFill>
+            </a:ext>
+            <a:ext uri="{91240B29-F687-4f45-9708-019B960494DF}">
+              <a14:hiddenLine xmlns:a14="http://schemas.microsoft.com/office/drawing/2010/main" w="9525">
+                <a:solidFill>
+                  <a:srgbClr val="000000"/>
+                </a:solidFill>
+                <a:miter lim="800000"/>
+                <a:headEnd/>
+                <a:tailEnd/>
+              </a14:hiddenLine>
+            </a:ext>
+          </a:extLst>
+        </p:spPr>
+        <p:txBody>
+          <a:bodyPr wrap="square">
+            <a:spAutoFit/>
+          </a:bodyPr>
+          <a:lstStyle>
+            <a:lvl1pPr marL="457200" indent="-457200">
+              <a:defRPr sz="3000">
+                <a:solidFill>
+                  <a:schemeClr val="tx1"/>
+                </a:solidFill>
+                <a:latin typeface="Times" charset="0"/>
+                <a:ea typeface="ＭＳ Ｐゴシック" charset="-128"/>
+              </a:defRPr>
+            </a:lvl1pPr>
+            <a:lvl2pPr marL="1092200" indent="-393700">
+              <a:defRPr sz="3000">
+                <a:solidFill>
+                  <a:schemeClr val="tx1"/>
+                </a:solidFill>
+                <a:latin typeface="Times" charset="0"/>
+                <a:ea typeface="ＭＳ Ｐゴシック" charset="-128"/>
+              </a:defRPr>
+            </a:lvl2pPr>
+            <a:lvl3pPr>
+              <a:defRPr sz="3000">
+                <a:solidFill>
+                  <a:schemeClr val="tx1"/>
+                </a:solidFill>
+                <a:latin typeface="Times" charset="0"/>
+                <a:ea typeface="ＭＳ Ｐゴシック" charset="-128"/>
+              </a:defRPr>
+            </a:lvl3pPr>
+            <a:lvl4pPr>
+              <a:defRPr sz="3000">
+                <a:solidFill>
+                  <a:schemeClr val="tx1"/>
+                </a:solidFill>
+                <a:latin typeface="Times" charset="0"/>
+                <a:ea typeface="ＭＳ Ｐゴシック" charset="-128"/>
+              </a:defRPr>
+            </a:lvl4pPr>
+            <a:lvl5pPr>
+              <a:defRPr sz="3000">
+                <a:solidFill>
+                  <a:schemeClr val="tx1"/>
+                </a:solidFill>
+                <a:latin typeface="Times" charset="0"/>
+                <a:ea typeface="ＭＳ Ｐゴシック" charset="-128"/>
+              </a:defRPr>
+            </a:lvl5pPr>
+            <a:lvl6pPr marL="457200" eaLnBrk="0" fontAlgn="base" hangingPunct="0">
+              <a:spcBef>
+                <a:spcPct val="0"/>
+              </a:spcBef>
+              <a:spcAft>
+                <a:spcPct val="0"/>
+              </a:spcAft>
+              <a:defRPr sz="3000">
+                <a:solidFill>
+                  <a:schemeClr val="tx1"/>
+                </a:solidFill>
+                <a:latin typeface="Times" charset="0"/>
+                <a:ea typeface="ＭＳ Ｐゴシック" charset="-128"/>
+              </a:defRPr>
+            </a:lvl6pPr>
+            <a:lvl7pPr marL="914400" eaLnBrk="0" fontAlgn="base" hangingPunct="0">
+              <a:spcBef>
+                <a:spcPct val="0"/>
+              </a:spcBef>
+              <a:spcAft>
+                <a:spcPct val="0"/>
+              </a:spcAft>
+              <a:defRPr sz="3000">
+                <a:solidFill>
+                  <a:schemeClr val="tx1"/>
+                </a:solidFill>
+                <a:latin typeface="Times" charset="0"/>
+                <a:ea typeface="ＭＳ Ｐゴシック" charset="-128"/>
+              </a:defRPr>
+            </a:lvl7pPr>
+            <a:lvl8pPr marL="1371600" eaLnBrk="0" fontAlgn="base" hangingPunct="0">
+              <a:spcBef>
+                <a:spcPct val="0"/>
+              </a:spcBef>
+              <a:spcAft>
+                <a:spcPct val="0"/>
+              </a:spcAft>
+              <a:defRPr sz="3000">
+                <a:solidFill>
+                  <a:schemeClr val="tx1"/>
+                </a:solidFill>
+                <a:latin typeface="Times" charset="0"/>
+                <a:ea typeface="ＭＳ Ｐゴシック" charset="-128"/>
+              </a:defRPr>
+            </a:lvl8pPr>
+            <a:lvl9pPr marL="1828800" eaLnBrk="0" fontAlgn="base" hangingPunct="0">
+              <a:spcBef>
+                <a:spcPct val="0"/>
+              </a:spcBef>
+              <a:spcAft>
+                <a:spcPct val="0"/>
+              </a:spcAft>
+              <a:defRPr sz="3000">
+                <a:solidFill>
+                  <a:schemeClr val="tx1"/>
+                </a:solidFill>
+                <a:latin typeface="Times" charset="0"/>
+                <a:ea typeface="ＭＳ Ｐゴシック" charset="-128"/>
+              </a:defRPr>
+            </a:lvl9pPr>
+          </a:lstStyle>
+          <a:p>
+            <a:pPr marL="698500" lvl="1" indent="0" algn="ctr">
+              <a:lnSpc>
+                <a:spcPct val="80000"/>
+              </a:lnSpc>
+              <a:spcBef>
+                <a:spcPct val="15000"/>
+              </a:spcBef>
+              <a:buClr>
+                <a:schemeClr val="accent2"/>
+              </a:buClr>
+              <a:buSzPct val="75000"/>
+            </a:pPr>
+            <a:r>
+              <a:rPr lang="en-US" sz="2000" b="1" dirty="0" smtClean="0">
+                <a:effectLst/>
+                <a:latin typeface="Helvetica" charset="0"/>
+              </a:rPr>
+              <a:t>Figure 2: ECDSA Signing (left) and Verification (right), crux of the operation is the point multiply, denoted with an asterisk</a:t>
+            </a:r>
+            <a:endParaRPr lang="en-US" sz="2000" b="1" dirty="0">
+              <a:effectLst/>
+              <a:latin typeface="Helvetica" charset="0"/>
+            </a:endParaRPr>
+          </a:p>
+          <a:p>
+            <a:pPr lvl="1">
+              <a:lnSpc>
+                <a:spcPct val="80000"/>
+              </a:lnSpc>
+              <a:spcBef>
+                <a:spcPct val="15000"/>
+              </a:spcBef>
+              <a:buClr>
+                <a:schemeClr val="accent1"/>
+              </a:buClr>
+              <a:buSzPct val="75000"/>
+            </a:pPr>
+            <a:endParaRPr lang="en-US" sz="2600" dirty="0">
+              <a:effectLst/>
+              <a:latin typeface="Helvetica" charset="0"/>
+            </a:endParaRPr>
+          </a:p>
+        </p:txBody>
+      </p:sp>
+      <p:sp>
+        <p:nvSpPr>
+          <p:cNvPr id="40" name="Text Box 1383"/>
+          <p:cNvSpPr txBox="1">
+            <a:spLocks noChangeArrowheads="1"/>
+          </p:cNvSpPr>
+          <p:nvPr/>
+        </p:nvSpPr>
+        <p:spPr bwMode="auto">
+          <a:xfrm>
+            <a:off x="11658600" y="26608365"/>
+            <a:ext cx="9829800" cy="348813"/>
+          </a:xfrm>
+          <a:prstGeom prst="rect">
+            <a:avLst/>
+          </a:prstGeom>
+          <a:noFill/>
+          <a:ln>
+            <a:noFill/>
+          </a:ln>
+          <a:extLst>
+            <a:ext uri="{909E8E84-426E-40dd-AFC4-6F175D3DCCD1}">
+              <a14:hiddenFill xmlns:a14="http://schemas.microsoft.com/office/drawing/2010/main">
+                <a:solidFill>
+                  <a:srgbClr val="FFFFFF"/>
+                </a:solidFill>
+              </a14:hiddenFill>
+            </a:ext>
+            <a:ext uri="{91240B29-F687-4f45-9708-019B960494DF}">
+              <a14:hiddenLine xmlns:a14="http://schemas.microsoft.com/office/drawing/2010/main" w="9525">
+                <a:solidFill>
+                  <a:srgbClr val="000000"/>
+                </a:solidFill>
+                <a:miter lim="800000"/>
+                <a:headEnd/>
+                <a:tailEnd/>
+              </a14:hiddenLine>
+            </a:ext>
+          </a:extLst>
+        </p:spPr>
+        <p:txBody>
+          <a:bodyPr wrap="square">
+            <a:spAutoFit/>
+          </a:bodyPr>
+          <a:lstStyle>
+            <a:lvl1pPr marL="457200" indent="-457200">
+              <a:defRPr sz="3000">
+                <a:solidFill>
+                  <a:schemeClr val="tx1"/>
+                </a:solidFill>
+                <a:latin typeface="Times" charset="0"/>
+                <a:ea typeface="ＭＳ Ｐゴシック" charset="-128"/>
+              </a:defRPr>
+            </a:lvl1pPr>
+            <a:lvl2pPr marL="1092200" indent="-393700">
+              <a:defRPr sz="3000">
+                <a:solidFill>
+                  <a:schemeClr val="tx1"/>
+                </a:solidFill>
+                <a:latin typeface="Times" charset="0"/>
+                <a:ea typeface="ＭＳ Ｐゴシック" charset="-128"/>
+              </a:defRPr>
+            </a:lvl2pPr>
+            <a:lvl3pPr>
+              <a:defRPr sz="3000">
+                <a:solidFill>
+                  <a:schemeClr val="tx1"/>
+                </a:solidFill>
+                <a:latin typeface="Times" charset="0"/>
+                <a:ea typeface="ＭＳ Ｐゴシック" charset="-128"/>
+              </a:defRPr>
+            </a:lvl3pPr>
+            <a:lvl4pPr>
+              <a:defRPr sz="3000">
+                <a:solidFill>
+                  <a:schemeClr val="tx1"/>
+                </a:solidFill>
+                <a:latin typeface="Times" charset="0"/>
+                <a:ea typeface="ＭＳ Ｐゴシック" charset="-128"/>
+              </a:defRPr>
+            </a:lvl4pPr>
+            <a:lvl5pPr>
+              <a:defRPr sz="3000">
+                <a:solidFill>
+                  <a:schemeClr val="tx1"/>
+                </a:solidFill>
+                <a:latin typeface="Times" charset="0"/>
+                <a:ea typeface="ＭＳ Ｐゴシック" charset="-128"/>
+              </a:defRPr>
+            </a:lvl5pPr>
+            <a:lvl6pPr marL="457200" eaLnBrk="0" fontAlgn="base" hangingPunct="0">
+              <a:spcBef>
+                <a:spcPct val="0"/>
+              </a:spcBef>
+              <a:spcAft>
+                <a:spcPct val="0"/>
+              </a:spcAft>
+              <a:defRPr sz="3000">
+                <a:solidFill>
+                  <a:schemeClr val="tx1"/>
+                </a:solidFill>
+                <a:latin typeface="Times" charset="0"/>
+                <a:ea typeface="ＭＳ Ｐゴシック" charset="-128"/>
+              </a:defRPr>
+            </a:lvl6pPr>
+            <a:lvl7pPr marL="914400" eaLnBrk="0" fontAlgn="base" hangingPunct="0">
+              <a:spcBef>
+                <a:spcPct val="0"/>
+              </a:spcBef>
+              <a:spcAft>
+                <a:spcPct val="0"/>
+              </a:spcAft>
+              <a:defRPr sz="3000">
+                <a:solidFill>
+                  <a:schemeClr val="tx1"/>
+                </a:solidFill>
+                <a:latin typeface="Times" charset="0"/>
+                <a:ea typeface="ＭＳ Ｐゴシック" charset="-128"/>
+              </a:defRPr>
+            </a:lvl7pPr>
+            <a:lvl8pPr marL="1371600" eaLnBrk="0" fontAlgn="base" hangingPunct="0">
+              <a:spcBef>
+                <a:spcPct val="0"/>
+              </a:spcBef>
+              <a:spcAft>
+                <a:spcPct val="0"/>
+              </a:spcAft>
+              <a:defRPr sz="3000">
+                <a:solidFill>
+                  <a:schemeClr val="tx1"/>
+                </a:solidFill>
+                <a:latin typeface="Times" charset="0"/>
+                <a:ea typeface="ＭＳ Ｐゴシック" charset="-128"/>
+              </a:defRPr>
+            </a:lvl8pPr>
+            <a:lvl9pPr marL="1828800" eaLnBrk="0" fontAlgn="base" hangingPunct="0">
+              <a:spcBef>
+                <a:spcPct val="0"/>
+              </a:spcBef>
+              <a:spcAft>
+                <a:spcPct val="0"/>
+              </a:spcAft>
+              <a:defRPr sz="3000">
+                <a:solidFill>
+                  <a:schemeClr val="tx1"/>
+                </a:solidFill>
+                <a:latin typeface="Times" charset="0"/>
+                <a:ea typeface="ＭＳ Ｐゴシック" charset="-128"/>
+              </a:defRPr>
+            </a:lvl9pPr>
+          </a:lstStyle>
+          <a:p>
+            <a:pPr marL="698500" lvl="1" indent="0" algn="ctr">
+              <a:lnSpc>
+                <a:spcPct val="80000"/>
+              </a:lnSpc>
+              <a:spcBef>
+                <a:spcPct val="15000"/>
+              </a:spcBef>
+              <a:buClr>
+                <a:schemeClr val="accent2"/>
+              </a:buClr>
+              <a:buSzPct val="75000"/>
+            </a:pPr>
+            <a:r>
+              <a:rPr lang="en-US" sz="2000" b="1" dirty="0" smtClean="0">
+                <a:latin typeface="Helvetica" charset="0"/>
+              </a:rPr>
+              <a:t>Figure 3: Point addition operation. When repeated becomes a multiply</a:t>
+            </a:r>
+            <a:endParaRPr lang="en-US" sz="2600" b="1" dirty="0">
+              <a:effectLst/>
+              <a:latin typeface="Helvetica" charset="0"/>
+            </a:endParaRPr>
+          </a:p>
+        </p:txBody>
+      </p:sp>
+      <p:sp>
+        <p:nvSpPr>
+          <p:cNvPr id="41" name="Text Box 1383"/>
+          <p:cNvSpPr txBox="1">
+            <a:spLocks noChangeArrowheads="1"/>
+          </p:cNvSpPr>
+          <p:nvPr/>
+        </p:nvSpPr>
+        <p:spPr bwMode="auto">
+          <a:xfrm>
+            <a:off x="762000" y="21424583"/>
+            <a:ext cx="6781800" cy="978217"/>
+          </a:xfrm>
+          <a:prstGeom prst="rect">
+            <a:avLst/>
+          </a:prstGeom>
+          <a:noFill/>
+          <a:ln>
+            <a:noFill/>
+          </a:ln>
+          <a:extLst>
+            <a:ext uri="{909E8E84-426E-40dd-AFC4-6F175D3DCCD1}">
+              <a14:hiddenFill xmlns:a14="http://schemas.microsoft.com/office/drawing/2010/main">
+                <a:solidFill>
+                  <a:srgbClr val="FFFFFF"/>
+                </a:solidFill>
+              </a14:hiddenFill>
+            </a:ext>
+            <a:ext uri="{91240B29-F687-4f45-9708-019B960494DF}">
+              <a14:hiddenLine xmlns:a14="http://schemas.microsoft.com/office/drawing/2010/main" w="9525">
+                <a:solidFill>
+                  <a:srgbClr val="000000"/>
+                </a:solidFill>
+                <a:miter lim="800000"/>
+                <a:headEnd/>
+                <a:tailEnd/>
+              </a14:hiddenLine>
+            </a:ext>
+          </a:extLst>
+        </p:spPr>
+        <p:txBody>
+          <a:bodyPr wrap="square">
+            <a:spAutoFit/>
+          </a:bodyPr>
+          <a:lstStyle>
+            <a:lvl1pPr marL="457200" indent="-457200">
+              <a:defRPr sz="3000">
+                <a:solidFill>
+                  <a:schemeClr val="tx1"/>
+                </a:solidFill>
+                <a:latin typeface="Times" charset="0"/>
+                <a:ea typeface="ＭＳ Ｐゴシック" charset="-128"/>
+              </a:defRPr>
+            </a:lvl1pPr>
+            <a:lvl2pPr marL="1092200" indent="-393700">
+              <a:defRPr sz="3000">
+                <a:solidFill>
+                  <a:schemeClr val="tx1"/>
+                </a:solidFill>
+                <a:latin typeface="Times" charset="0"/>
+                <a:ea typeface="ＭＳ Ｐゴシック" charset="-128"/>
+              </a:defRPr>
+            </a:lvl2pPr>
+            <a:lvl3pPr>
+              <a:defRPr sz="3000">
+                <a:solidFill>
+                  <a:schemeClr val="tx1"/>
+                </a:solidFill>
+                <a:latin typeface="Times" charset="0"/>
+                <a:ea typeface="ＭＳ Ｐゴシック" charset="-128"/>
+              </a:defRPr>
+            </a:lvl3pPr>
+            <a:lvl4pPr>
+              <a:defRPr sz="3000">
+                <a:solidFill>
+                  <a:schemeClr val="tx1"/>
+                </a:solidFill>
+                <a:latin typeface="Times" charset="0"/>
+                <a:ea typeface="ＭＳ Ｐゴシック" charset="-128"/>
+              </a:defRPr>
+            </a:lvl4pPr>
+            <a:lvl5pPr>
+              <a:defRPr sz="3000">
+                <a:solidFill>
+                  <a:schemeClr val="tx1"/>
+                </a:solidFill>
+                <a:latin typeface="Times" charset="0"/>
+                <a:ea typeface="ＭＳ Ｐゴシック" charset="-128"/>
+              </a:defRPr>
+            </a:lvl5pPr>
+            <a:lvl6pPr marL="457200" eaLnBrk="0" fontAlgn="base" hangingPunct="0">
+              <a:spcBef>
+                <a:spcPct val="0"/>
+              </a:spcBef>
+              <a:spcAft>
+                <a:spcPct val="0"/>
+              </a:spcAft>
+              <a:defRPr sz="3000">
+                <a:solidFill>
+                  <a:schemeClr val="tx1"/>
+                </a:solidFill>
+                <a:latin typeface="Times" charset="0"/>
+                <a:ea typeface="ＭＳ Ｐゴシック" charset="-128"/>
+              </a:defRPr>
+            </a:lvl6pPr>
+            <a:lvl7pPr marL="914400" eaLnBrk="0" fontAlgn="base" hangingPunct="0">
+              <a:spcBef>
+                <a:spcPct val="0"/>
+              </a:spcBef>
+              <a:spcAft>
+                <a:spcPct val="0"/>
+              </a:spcAft>
+              <a:defRPr sz="3000">
+                <a:solidFill>
+                  <a:schemeClr val="tx1"/>
+                </a:solidFill>
+                <a:latin typeface="Times" charset="0"/>
+                <a:ea typeface="ＭＳ Ｐゴシック" charset="-128"/>
+              </a:defRPr>
+            </a:lvl7pPr>
+            <a:lvl8pPr marL="1371600" eaLnBrk="0" fontAlgn="base" hangingPunct="0">
+              <a:spcBef>
+                <a:spcPct val="0"/>
+              </a:spcBef>
+              <a:spcAft>
+                <a:spcPct val="0"/>
+              </a:spcAft>
+              <a:defRPr sz="3000">
+                <a:solidFill>
+                  <a:schemeClr val="tx1"/>
+                </a:solidFill>
+                <a:latin typeface="Times" charset="0"/>
+                <a:ea typeface="ＭＳ Ｐゴシック" charset="-128"/>
+              </a:defRPr>
+            </a:lvl8pPr>
+            <a:lvl9pPr marL="1828800" eaLnBrk="0" fontAlgn="base" hangingPunct="0">
+              <a:spcBef>
+                <a:spcPct val="0"/>
+              </a:spcBef>
+              <a:spcAft>
+                <a:spcPct val="0"/>
+              </a:spcAft>
+              <a:defRPr sz="3000">
+                <a:solidFill>
+                  <a:schemeClr val="tx1"/>
+                </a:solidFill>
+                <a:latin typeface="Times" charset="0"/>
+                <a:ea typeface="ＭＳ Ｐゴシック" charset="-128"/>
+              </a:defRPr>
+            </a:lvl9pPr>
+          </a:lstStyle>
+          <a:p>
+            <a:pPr marL="698500" lvl="1" indent="0" algn="ctr">
+              <a:lnSpc>
+                <a:spcPct val="80000"/>
+              </a:lnSpc>
+              <a:spcBef>
+                <a:spcPct val="15000"/>
+              </a:spcBef>
+              <a:buClr>
+                <a:schemeClr val="accent2"/>
+              </a:buClr>
+              <a:buSzPct val="75000"/>
+            </a:pPr>
+            <a:r>
+              <a:rPr lang="en-US" sz="2000" b="1" dirty="0" smtClean="0">
+                <a:effectLst/>
+                <a:latin typeface="Helvetica" charset="0"/>
+              </a:rPr>
+              <a:t>Figure 1: Geometric representation of an elliptic </a:t>
+            </a:r>
+            <a:br>
+              <a:rPr lang="en-US" sz="2000" b="1" dirty="0" smtClean="0">
+                <a:effectLst/>
+                <a:latin typeface="Helvetica" charset="0"/>
+              </a:rPr>
+            </a:br>
+            <a:r>
+              <a:rPr lang="en-US" sz="2000" b="1" dirty="0" smtClean="0">
+                <a:effectLst/>
+                <a:latin typeface="Helvetica" charset="0"/>
+              </a:rPr>
+              <a:t>curve and a point addition</a:t>
+            </a:r>
+            <a:endParaRPr lang="en-US" sz="2000" b="1" dirty="0">
+              <a:effectLst/>
+              <a:latin typeface="Helvetica" charset="0"/>
+            </a:endParaRPr>
+          </a:p>
+          <a:p>
+            <a:pPr lvl="1">
+              <a:lnSpc>
+                <a:spcPct val="80000"/>
+              </a:lnSpc>
+              <a:spcBef>
+                <a:spcPct val="15000"/>
+              </a:spcBef>
+              <a:buClr>
+                <a:schemeClr val="accent1"/>
+              </a:buClr>
+              <a:buSzPct val="75000"/>
+            </a:pPr>
+            <a:endParaRPr lang="en-US" sz="2600" dirty="0">
+              <a:effectLst/>
+              <a:latin typeface="Helvetica" charset="0"/>
+            </a:endParaRPr>
+          </a:p>
+        </p:txBody>
+      </p:sp>
+      <p:sp>
+        <p:nvSpPr>
+          <p:cNvPr id="42" name="Text Box 1383"/>
+          <p:cNvSpPr txBox="1">
+            <a:spLocks noChangeArrowheads="1"/>
+          </p:cNvSpPr>
+          <p:nvPr/>
+        </p:nvSpPr>
+        <p:spPr bwMode="auto">
+          <a:xfrm>
+            <a:off x="24003000" y="19964400"/>
+            <a:ext cx="7772400" cy="595035"/>
+          </a:xfrm>
+          <a:prstGeom prst="rect">
+            <a:avLst/>
+          </a:prstGeom>
+          <a:noFill/>
+          <a:ln>
+            <a:noFill/>
+          </a:ln>
+          <a:extLst>
+            <a:ext uri="{909E8E84-426E-40dd-AFC4-6F175D3DCCD1}">
+              <a14:hiddenFill xmlns:a14="http://schemas.microsoft.com/office/drawing/2010/main">
+                <a:solidFill>
+                  <a:srgbClr val="FFFFFF"/>
+                </a:solidFill>
+              </a14:hiddenFill>
+            </a:ext>
+            <a:ext uri="{91240B29-F687-4f45-9708-019B960494DF}">
+              <a14:hiddenLine xmlns:a14="http://schemas.microsoft.com/office/drawing/2010/main" w="9525">
+                <a:solidFill>
+                  <a:srgbClr val="000000"/>
+                </a:solidFill>
+                <a:miter lim="800000"/>
+                <a:headEnd/>
+                <a:tailEnd/>
+              </a14:hiddenLine>
+            </a:ext>
+          </a:extLst>
+        </p:spPr>
+        <p:txBody>
+          <a:bodyPr wrap="square">
+            <a:spAutoFit/>
+          </a:bodyPr>
+          <a:lstStyle>
+            <a:lvl1pPr marL="457200" indent="-457200">
+              <a:defRPr sz="3000">
+                <a:solidFill>
+                  <a:schemeClr val="tx1"/>
+                </a:solidFill>
+                <a:latin typeface="Times" charset="0"/>
+                <a:ea typeface="ＭＳ Ｐゴシック" charset="-128"/>
+              </a:defRPr>
+            </a:lvl1pPr>
+            <a:lvl2pPr marL="1092200" indent="-393700">
+              <a:defRPr sz="3000">
+                <a:solidFill>
+                  <a:schemeClr val="tx1"/>
+                </a:solidFill>
+                <a:latin typeface="Times" charset="0"/>
+                <a:ea typeface="ＭＳ Ｐゴシック" charset="-128"/>
+              </a:defRPr>
+            </a:lvl2pPr>
+            <a:lvl3pPr>
+              <a:defRPr sz="3000">
+                <a:solidFill>
+                  <a:schemeClr val="tx1"/>
+                </a:solidFill>
+                <a:latin typeface="Times" charset="0"/>
+                <a:ea typeface="ＭＳ Ｐゴシック" charset="-128"/>
+              </a:defRPr>
+            </a:lvl3pPr>
+            <a:lvl4pPr>
+              <a:defRPr sz="3000">
+                <a:solidFill>
+                  <a:schemeClr val="tx1"/>
+                </a:solidFill>
+                <a:latin typeface="Times" charset="0"/>
+                <a:ea typeface="ＭＳ Ｐゴシック" charset="-128"/>
+              </a:defRPr>
+            </a:lvl4pPr>
+            <a:lvl5pPr>
+              <a:defRPr sz="3000">
+                <a:solidFill>
+                  <a:schemeClr val="tx1"/>
+                </a:solidFill>
+                <a:latin typeface="Times" charset="0"/>
+                <a:ea typeface="ＭＳ Ｐゴシック" charset="-128"/>
+              </a:defRPr>
+            </a:lvl5pPr>
+            <a:lvl6pPr marL="457200" eaLnBrk="0" fontAlgn="base" hangingPunct="0">
+              <a:spcBef>
+                <a:spcPct val="0"/>
+              </a:spcBef>
+              <a:spcAft>
+                <a:spcPct val="0"/>
+              </a:spcAft>
+              <a:defRPr sz="3000">
+                <a:solidFill>
+                  <a:schemeClr val="tx1"/>
+                </a:solidFill>
+                <a:latin typeface="Times" charset="0"/>
+                <a:ea typeface="ＭＳ Ｐゴシック" charset="-128"/>
+              </a:defRPr>
+            </a:lvl6pPr>
+            <a:lvl7pPr marL="914400" eaLnBrk="0" fontAlgn="base" hangingPunct="0">
+              <a:spcBef>
+                <a:spcPct val="0"/>
+              </a:spcBef>
+              <a:spcAft>
+                <a:spcPct val="0"/>
+              </a:spcAft>
+              <a:defRPr sz="3000">
+                <a:solidFill>
+                  <a:schemeClr val="tx1"/>
+                </a:solidFill>
+                <a:latin typeface="Times" charset="0"/>
+                <a:ea typeface="ＭＳ Ｐゴシック" charset="-128"/>
+              </a:defRPr>
+            </a:lvl7pPr>
+            <a:lvl8pPr marL="1371600" eaLnBrk="0" fontAlgn="base" hangingPunct="0">
+              <a:spcBef>
+                <a:spcPct val="0"/>
+              </a:spcBef>
+              <a:spcAft>
+                <a:spcPct val="0"/>
+              </a:spcAft>
+              <a:defRPr sz="3000">
+                <a:solidFill>
+                  <a:schemeClr val="tx1"/>
+                </a:solidFill>
+                <a:latin typeface="Times" charset="0"/>
+                <a:ea typeface="ＭＳ Ｐゴシック" charset="-128"/>
+              </a:defRPr>
+            </a:lvl8pPr>
+            <a:lvl9pPr marL="1828800" eaLnBrk="0" fontAlgn="base" hangingPunct="0">
+              <a:spcBef>
+                <a:spcPct val="0"/>
+              </a:spcBef>
+              <a:spcAft>
+                <a:spcPct val="0"/>
+              </a:spcAft>
+              <a:defRPr sz="3000">
+                <a:solidFill>
+                  <a:schemeClr val="tx1"/>
+                </a:solidFill>
+                <a:latin typeface="Times" charset="0"/>
+                <a:ea typeface="ＭＳ Ｐゴシック" charset="-128"/>
+              </a:defRPr>
+            </a:lvl9pPr>
+          </a:lstStyle>
+          <a:p>
+            <a:pPr marL="698500" lvl="1" indent="0" algn="ctr">
+              <a:lnSpc>
+                <a:spcPct val="80000"/>
+              </a:lnSpc>
+              <a:spcBef>
+                <a:spcPct val="15000"/>
+              </a:spcBef>
+              <a:buClr>
+                <a:schemeClr val="accent2"/>
+              </a:buClr>
+              <a:buSzPct val="75000"/>
+            </a:pPr>
+            <a:r>
+              <a:rPr lang="en-US" sz="2000" b="1" dirty="0" smtClean="0">
+                <a:latin typeface="Helvetica" charset="0"/>
+              </a:rPr>
+              <a:t>Figure 4: Block diagram of the coprocessor that connects of the rocket core</a:t>
+            </a:r>
+            <a:endParaRPr lang="en-US" sz="2600" b="1" dirty="0">
+              <a:effectLst/>
+              <a:latin typeface="Helvetica" charset="0"/>
+            </a:endParaRPr>
+          </a:p>
+        </p:txBody>
+      </p:sp>
+      <p:sp>
+        <p:nvSpPr>
+          <p:cNvPr id="96" name="Text Box 1383"/>
+          <p:cNvSpPr txBox="1">
+            <a:spLocks noChangeArrowheads="1"/>
+          </p:cNvSpPr>
+          <p:nvPr/>
+        </p:nvSpPr>
+        <p:spPr bwMode="auto">
+          <a:xfrm>
+            <a:off x="11277600" y="13365005"/>
+            <a:ext cx="10134600" cy="731995"/>
+          </a:xfrm>
+          <a:prstGeom prst="rect">
+            <a:avLst/>
+          </a:prstGeom>
+          <a:noFill/>
+          <a:ln>
+            <a:noFill/>
+          </a:ln>
+          <a:extLst>
+            <a:ext uri="{909E8E84-426E-40dd-AFC4-6F175D3DCCD1}">
+              <a14:hiddenFill xmlns:a14="http://schemas.microsoft.com/office/drawing/2010/main">
+                <a:solidFill>
+                  <a:srgbClr val="FFFFFF"/>
+                </a:solidFill>
+              </a14:hiddenFill>
+            </a:ext>
+            <a:ext uri="{91240B29-F687-4f45-9708-019B960494DF}">
+              <a14:hiddenLine xmlns:a14="http://schemas.microsoft.com/office/drawing/2010/main" w="9525">
+                <a:solidFill>
+                  <a:srgbClr val="000000"/>
+                </a:solidFill>
+                <a:miter lim="800000"/>
+                <a:headEnd/>
+                <a:tailEnd/>
+              </a14:hiddenLine>
+            </a:ext>
+          </a:extLst>
+        </p:spPr>
+        <p:txBody>
+          <a:bodyPr wrap="square">
+            <a:spAutoFit/>
+          </a:bodyPr>
+          <a:lstStyle>
+            <a:lvl1pPr marL="457200" indent="-457200">
+              <a:defRPr sz="3000">
+                <a:solidFill>
+                  <a:schemeClr val="tx1"/>
+                </a:solidFill>
+                <a:latin typeface="Times" charset="0"/>
+                <a:ea typeface="ＭＳ Ｐゴシック" charset="-128"/>
+              </a:defRPr>
+            </a:lvl1pPr>
+            <a:lvl2pPr marL="1092200" indent="-393700">
+              <a:defRPr sz="3000">
+                <a:solidFill>
+                  <a:schemeClr val="tx1"/>
+                </a:solidFill>
+                <a:latin typeface="Times" charset="0"/>
+                <a:ea typeface="ＭＳ Ｐゴシック" charset="-128"/>
+              </a:defRPr>
+            </a:lvl2pPr>
+            <a:lvl3pPr>
+              <a:defRPr sz="3000">
+                <a:solidFill>
+                  <a:schemeClr val="tx1"/>
+                </a:solidFill>
+                <a:latin typeface="Times" charset="0"/>
+                <a:ea typeface="ＭＳ Ｐゴシック" charset="-128"/>
+              </a:defRPr>
+            </a:lvl3pPr>
+            <a:lvl4pPr>
+              <a:defRPr sz="3000">
+                <a:solidFill>
+                  <a:schemeClr val="tx1"/>
+                </a:solidFill>
+                <a:latin typeface="Times" charset="0"/>
+                <a:ea typeface="ＭＳ Ｐゴシック" charset="-128"/>
+              </a:defRPr>
+            </a:lvl4pPr>
+            <a:lvl5pPr>
+              <a:defRPr sz="3000">
+                <a:solidFill>
+                  <a:schemeClr val="tx1"/>
+                </a:solidFill>
+                <a:latin typeface="Times" charset="0"/>
+                <a:ea typeface="ＭＳ Ｐゴシック" charset="-128"/>
+              </a:defRPr>
+            </a:lvl5pPr>
+            <a:lvl6pPr marL="457200" eaLnBrk="0" fontAlgn="base" hangingPunct="0">
+              <a:spcBef>
+                <a:spcPct val="0"/>
+              </a:spcBef>
+              <a:spcAft>
+                <a:spcPct val="0"/>
+              </a:spcAft>
+              <a:defRPr sz="3000">
+                <a:solidFill>
+                  <a:schemeClr val="tx1"/>
+                </a:solidFill>
+                <a:latin typeface="Times" charset="0"/>
+                <a:ea typeface="ＭＳ Ｐゴシック" charset="-128"/>
+              </a:defRPr>
+            </a:lvl6pPr>
+            <a:lvl7pPr marL="914400" eaLnBrk="0" fontAlgn="base" hangingPunct="0">
+              <a:spcBef>
+                <a:spcPct val="0"/>
+              </a:spcBef>
+              <a:spcAft>
+                <a:spcPct val="0"/>
+              </a:spcAft>
+              <a:defRPr sz="3000">
+                <a:solidFill>
+                  <a:schemeClr val="tx1"/>
+                </a:solidFill>
+                <a:latin typeface="Times" charset="0"/>
+                <a:ea typeface="ＭＳ Ｐゴシック" charset="-128"/>
+              </a:defRPr>
+            </a:lvl7pPr>
+            <a:lvl8pPr marL="1371600" eaLnBrk="0" fontAlgn="base" hangingPunct="0">
+              <a:spcBef>
+                <a:spcPct val="0"/>
+              </a:spcBef>
+              <a:spcAft>
+                <a:spcPct val="0"/>
+              </a:spcAft>
+              <a:defRPr sz="3000">
+                <a:solidFill>
+                  <a:schemeClr val="tx1"/>
+                </a:solidFill>
+                <a:latin typeface="Times" charset="0"/>
+                <a:ea typeface="ＭＳ Ｐゴシック" charset="-128"/>
+              </a:defRPr>
+            </a:lvl8pPr>
+            <a:lvl9pPr marL="1828800" eaLnBrk="0" fontAlgn="base" hangingPunct="0">
+              <a:spcBef>
+                <a:spcPct val="0"/>
+              </a:spcBef>
+              <a:spcAft>
+                <a:spcPct val="0"/>
+              </a:spcAft>
+              <a:defRPr sz="3000">
+                <a:solidFill>
+                  <a:schemeClr val="tx1"/>
+                </a:solidFill>
+                <a:latin typeface="Times" charset="0"/>
+                <a:ea typeface="ＭＳ Ｐゴシック" charset="-128"/>
+              </a:defRPr>
+            </a:lvl9pPr>
+          </a:lstStyle>
+          <a:p>
+            <a:pPr marL="698500" lvl="1" indent="0" algn="ctr">
+              <a:lnSpc>
+                <a:spcPct val="80000"/>
+              </a:lnSpc>
+              <a:spcBef>
+                <a:spcPct val="15000"/>
+              </a:spcBef>
+              <a:buClr>
+                <a:schemeClr val="accent2"/>
+              </a:buClr>
+              <a:buSzPct val="75000"/>
+            </a:pPr>
+            <a:r>
+              <a:rPr lang="en-US" sz="2000" b="1" dirty="0" smtClean="0">
+                <a:effectLst/>
+                <a:latin typeface="Helvetica" charset="0"/>
+              </a:rPr>
+              <a:t>Table 1: Comparison of key sizes neede</a:t>
+            </a:r>
+            <a:r>
+              <a:rPr lang="en-US" sz="2000" b="1" dirty="0" smtClean="0">
+                <a:latin typeface="Helvetica" charset="0"/>
+              </a:rPr>
+              <a:t>d for elliptic curves </a:t>
+            </a:r>
+            <a:r>
+              <a:rPr lang="en-US" sz="2000" b="1" dirty="0" err="1" smtClean="0">
+                <a:latin typeface="Helvetica" charset="0"/>
+              </a:rPr>
+              <a:t>vs</a:t>
+            </a:r>
+            <a:r>
+              <a:rPr lang="en-US" sz="2000" b="1" dirty="0" smtClean="0">
+                <a:latin typeface="Helvetica" charset="0"/>
+              </a:rPr>
+              <a:t> integer fields </a:t>
+            </a:r>
+            <a:endParaRPr lang="en-US" sz="2000" b="1" dirty="0">
+              <a:effectLst/>
+              <a:latin typeface="Helvetica" charset="0"/>
+            </a:endParaRPr>
+          </a:p>
+          <a:p>
+            <a:pPr lvl="1">
+              <a:lnSpc>
+                <a:spcPct val="80000"/>
+              </a:lnSpc>
+              <a:spcBef>
+                <a:spcPct val="15000"/>
+              </a:spcBef>
+              <a:buClr>
+                <a:schemeClr val="accent1"/>
+              </a:buClr>
+              <a:buSzPct val="75000"/>
+            </a:pPr>
+            <a:endParaRPr lang="en-US" sz="2600" dirty="0">
+              <a:effectLst/>
+              <a:latin typeface="Helvetica" charset="0"/>
+            </a:endParaRPr>
+          </a:p>
+        </p:txBody>
+      </p:sp>
+      <p:sp>
+        <p:nvSpPr>
+          <p:cNvPr id="97" name="Text Box 1383"/>
+          <p:cNvSpPr txBox="1">
+            <a:spLocks noChangeArrowheads="1"/>
+          </p:cNvSpPr>
+          <p:nvPr/>
+        </p:nvSpPr>
+        <p:spPr bwMode="auto">
+          <a:xfrm>
+            <a:off x="23545800" y="26453783"/>
+            <a:ext cx="8839200" cy="978217"/>
+          </a:xfrm>
+          <a:prstGeom prst="rect">
+            <a:avLst/>
+          </a:prstGeom>
+          <a:noFill/>
+          <a:ln>
+            <a:noFill/>
+          </a:ln>
+          <a:extLst>
+            <a:ext uri="{909E8E84-426E-40dd-AFC4-6F175D3DCCD1}">
+              <a14:hiddenFill xmlns:a14="http://schemas.microsoft.com/office/drawing/2010/main">
+                <a:solidFill>
+                  <a:srgbClr val="FFFFFF"/>
+                </a:solidFill>
+              </a14:hiddenFill>
+            </a:ext>
+            <a:ext uri="{91240B29-F687-4f45-9708-019B960494DF}">
+              <a14:hiddenLine xmlns:a14="http://schemas.microsoft.com/office/drawing/2010/main" w="9525">
+                <a:solidFill>
+                  <a:srgbClr val="000000"/>
+                </a:solidFill>
+                <a:miter lim="800000"/>
+                <a:headEnd/>
+                <a:tailEnd/>
+              </a14:hiddenLine>
+            </a:ext>
+          </a:extLst>
+        </p:spPr>
+        <p:txBody>
+          <a:bodyPr wrap="square">
+            <a:spAutoFit/>
+          </a:bodyPr>
+          <a:lstStyle>
+            <a:lvl1pPr marL="457200" indent="-457200">
+              <a:defRPr sz="3000">
+                <a:solidFill>
+                  <a:schemeClr val="tx1"/>
+                </a:solidFill>
+                <a:latin typeface="Times" charset="0"/>
+                <a:ea typeface="ＭＳ Ｐゴシック" charset="-128"/>
+              </a:defRPr>
+            </a:lvl1pPr>
+            <a:lvl2pPr marL="1092200" indent="-393700">
+              <a:defRPr sz="3000">
+                <a:solidFill>
+                  <a:schemeClr val="tx1"/>
+                </a:solidFill>
+                <a:latin typeface="Times" charset="0"/>
+                <a:ea typeface="ＭＳ Ｐゴシック" charset="-128"/>
+              </a:defRPr>
+            </a:lvl2pPr>
+            <a:lvl3pPr>
+              <a:defRPr sz="3000">
+                <a:solidFill>
+                  <a:schemeClr val="tx1"/>
+                </a:solidFill>
+                <a:latin typeface="Times" charset="0"/>
+                <a:ea typeface="ＭＳ Ｐゴシック" charset="-128"/>
+              </a:defRPr>
+            </a:lvl3pPr>
+            <a:lvl4pPr>
+              <a:defRPr sz="3000">
+                <a:solidFill>
+                  <a:schemeClr val="tx1"/>
+                </a:solidFill>
+                <a:latin typeface="Times" charset="0"/>
+                <a:ea typeface="ＭＳ Ｐゴシック" charset="-128"/>
+              </a:defRPr>
+            </a:lvl4pPr>
+            <a:lvl5pPr>
+              <a:defRPr sz="3000">
+                <a:solidFill>
+                  <a:schemeClr val="tx1"/>
+                </a:solidFill>
+                <a:latin typeface="Times" charset="0"/>
+                <a:ea typeface="ＭＳ Ｐゴシック" charset="-128"/>
+              </a:defRPr>
+            </a:lvl5pPr>
+            <a:lvl6pPr marL="457200" eaLnBrk="0" fontAlgn="base" hangingPunct="0">
+              <a:spcBef>
+                <a:spcPct val="0"/>
+              </a:spcBef>
+              <a:spcAft>
+                <a:spcPct val="0"/>
+              </a:spcAft>
+              <a:defRPr sz="3000">
+                <a:solidFill>
+                  <a:schemeClr val="tx1"/>
+                </a:solidFill>
+                <a:latin typeface="Times" charset="0"/>
+                <a:ea typeface="ＭＳ Ｐゴシック" charset="-128"/>
+              </a:defRPr>
+            </a:lvl6pPr>
+            <a:lvl7pPr marL="914400" eaLnBrk="0" fontAlgn="base" hangingPunct="0">
+              <a:spcBef>
+                <a:spcPct val="0"/>
+              </a:spcBef>
+              <a:spcAft>
+                <a:spcPct val="0"/>
+              </a:spcAft>
+              <a:defRPr sz="3000">
+                <a:solidFill>
+                  <a:schemeClr val="tx1"/>
+                </a:solidFill>
+                <a:latin typeface="Times" charset="0"/>
+                <a:ea typeface="ＭＳ Ｐゴシック" charset="-128"/>
+              </a:defRPr>
+            </a:lvl7pPr>
+            <a:lvl8pPr marL="1371600" eaLnBrk="0" fontAlgn="base" hangingPunct="0">
+              <a:spcBef>
+                <a:spcPct val="0"/>
+              </a:spcBef>
+              <a:spcAft>
+                <a:spcPct val="0"/>
+              </a:spcAft>
+              <a:defRPr sz="3000">
+                <a:solidFill>
+                  <a:schemeClr val="tx1"/>
+                </a:solidFill>
+                <a:latin typeface="Times" charset="0"/>
+                <a:ea typeface="ＭＳ Ｐゴシック" charset="-128"/>
+              </a:defRPr>
+            </a:lvl8pPr>
+            <a:lvl9pPr marL="1828800" eaLnBrk="0" fontAlgn="base" hangingPunct="0">
+              <a:spcBef>
+                <a:spcPct val="0"/>
+              </a:spcBef>
+              <a:spcAft>
+                <a:spcPct val="0"/>
+              </a:spcAft>
+              <a:defRPr sz="3000">
+                <a:solidFill>
+                  <a:schemeClr val="tx1"/>
+                </a:solidFill>
+                <a:latin typeface="Times" charset="0"/>
+                <a:ea typeface="ＭＳ Ｐゴシック" charset="-128"/>
+              </a:defRPr>
+            </a:lvl9pPr>
+          </a:lstStyle>
+          <a:p>
+            <a:pPr marL="698500" lvl="1" indent="0" algn="ctr">
+              <a:lnSpc>
+                <a:spcPct val="80000"/>
+              </a:lnSpc>
+              <a:spcBef>
+                <a:spcPct val="15000"/>
+              </a:spcBef>
+              <a:buClr>
+                <a:schemeClr val="accent2"/>
+              </a:buClr>
+              <a:buSzPct val="75000"/>
+            </a:pPr>
+            <a:r>
+              <a:rPr lang="en-US" sz="2000" b="1" dirty="0" smtClean="0">
+                <a:effectLst/>
+                <a:latin typeface="Helvetica" charset="0"/>
+              </a:rPr>
+              <a:t>Table 2: </a:t>
+            </a:r>
+            <a:r>
+              <a:rPr lang="en-US" sz="2000" b="1" dirty="0" smtClean="0">
+                <a:latin typeface="Helvetica" charset="0"/>
+              </a:rPr>
+              <a:t>Results of various hardware configurations</a:t>
+            </a:r>
+            <a:r>
+              <a:rPr lang="en-US" sz="2000" b="1" dirty="0" smtClean="0">
+                <a:latin typeface="Helvetica" charset="0"/>
+              </a:rPr>
+              <a:t> </a:t>
+            </a:r>
+            <a:br>
+              <a:rPr lang="en-US" sz="2000" b="1" dirty="0" smtClean="0">
+                <a:latin typeface="Helvetica" charset="0"/>
+              </a:rPr>
+            </a:br>
+            <a:r>
+              <a:rPr lang="en-US" sz="2000" b="1" dirty="0" smtClean="0">
+                <a:latin typeface="Helvetica" charset="0"/>
+              </a:rPr>
+              <a:t>using 45 nm educational libraries </a:t>
+            </a:r>
+            <a:endParaRPr lang="en-US" sz="2000" b="1" dirty="0">
+              <a:effectLst/>
+              <a:latin typeface="Helvetica" charset="0"/>
+            </a:endParaRPr>
+          </a:p>
+          <a:p>
+            <a:pPr lvl="1">
+              <a:lnSpc>
+                <a:spcPct val="80000"/>
+              </a:lnSpc>
+              <a:spcBef>
+                <a:spcPct val="15000"/>
+              </a:spcBef>
+              <a:buClr>
+                <a:schemeClr val="accent1"/>
+              </a:buClr>
+              <a:buSzPct val="75000"/>
+            </a:pPr>
+            <a:endParaRPr lang="en-US" sz="2600" dirty="0">
+              <a:effectLst/>
+              <a:latin typeface="Helvetica" charset="0"/>
+            </a:endParaRPr>
+          </a:p>
+        </p:txBody>
+      </p:sp>
     </p:spTree>
     <p:extLst>
       <p:ext uri="{BB962C8B-B14F-4D97-AF65-F5344CB8AC3E}">
@@ -7273,6 +8921,13 @@
   <p:clrMapOvr>
     <a:masterClrMapping/>
   </p:clrMapOvr>
+  <p:timing>
+    <p:tnLst>
+      <p:par>
+        <p:cTn xmlns:p14="http://schemas.microsoft.com/office/powerpoint/2010/main" id="1" dur="indefinite" restart="never" nodeType="tmRoot"/>
+      </p:par>
+    </p:tnLst>
+  </p:timing>
 </p:sld>
 </file>
 

</xml_diff>